<commit_message>
Final Presentation and Notebook Added
</commit_message>
<xml_diff>
--- a/presentation.pptx
+++ b/presentation.pptx
@@ -13,7 +13,9 @@
     <p:sldId id="261" r:id="rId7"/>
     <p:sldId id="262" r:id="rId8"/>
     <p:sldId id="264" r:id="rId9"/>
-    <p:sldId id="263" r:id="rId10"/>
+    <p:sldId id="265" r:id="rId10"/>
+    <p:sldId id="266" r:id="rId11"/>
+    <p:sldId id="263" r:id="rId12"/>
   </p:sldIdLst>
   <p:sldSz cx="12192000" cy="6858000"/>
   <p:notesSz cx="6858000" cy="9144000"/>
@@ -267,7 +269,7 @@
           <a:p>
             <a:fld id="{CF7812AF-8950-4BC2-ABC0-4A6252211618}" type="datetimeFigureOut">
               <a:rPr lang="en-US" smtClean="0"/>
-              <a:t>6/11/2019</a:t>
+              <a:t>6/12/2019</a:t>
             </a:fld>
             <a:endParaRPr lang="en-US"/>
           </a:p>
@@ -465,7 +467,7 @@
           <a:p>
             <a:fld id="{CF7812AF-8950-4BC2-ABC0-4A6252211618}" type="datetimeFigureOut">
               <a:rPr lang="en-US" smtClean="0"/>
-              <a:t>6/11/2019</a:t>
+              <a:t>6/12/2019</a:t>
             </a:fld>
             <a:endParaRPr lang="en-US"/>
           </a:p>
@@ -673,7 +675,7 @@
           <a:p>
             <a:fld id="{CF7812AF-8950-4BC2-ABC0-4A6252211618}" type="datetimeFigureOut">
               <a:rPr lang="en-US" smtClean="0"/>
-              <a:t>6/11/2019</a:t>
+              <a:t>6/12/2019</a:t>
             </a:fld>
             <a:endParaRPr lang="en-US"/>
           </a:p>
@@ -871,7 +873,7 @@
           <a:p>
             <a:fld id="{CF7812AF-8950-4BC2-ABC0-4A6252211618}" type="datetimeFigureOut">
               <a:rPr lang="en-US" smtClean="0"/>
-              <a:t>6/11/2019</a:t>
+              <a:t>6/12/2019</a:t>
             </a:fld>
             <a:endParaRPr lang="en-US"/>
           </a:p>
@@ -1146,7 +1148,7 @@
           <a:p>
             <a:fld id="{CF7812AF-8950-4BC2-ABC0-4A6252211618}" type="datetimeFigureOut">
               <a:rPr lang="en-US" smtClean="0"/>
-              <a:t>6/11/2019</a:t>
+              <a:t>6/12/2019</a:t>
             </a:fld>
             <a:endParaRPr lang="en-US"/>
           </a:p>
@@ -1411,7 +1413,7 @@
           <a:p>
             <a:fld id="{CF7812AF-8950-4BC2-ABC0-4A6252211618}" type="datetimeFigureOut">
               <a:rPr lang="en-US" smtClean="0"/>
-              <a:t>6/11/2019</a:t>
+              <a:t>6/12/2019</a:t>
             </a:fld>
             <a:endParaRPr lang="en-US"/>
           </a:p>
@@ -1823,7 +1825,7 @@
           <a:p>
             <a:fld id="{CF7812AF-8950-4BC2-ABC0-4A6252211618}" type="datetimeFigureOut">
               <a:rPr lang="en-US" smtClean="0"/>
-              <a:t>6/11/2019</a:t>
+              <a:t>6/12/2019</a:t>
             </a:fld>
             <a:endParaRPr lang="en-US"/>
           </a:p>
@@ -1964,7 +1966,7 @@
           <a:p>
             <a:fld id="{CF7812AF-8950-4BC2-ABC0-4A6252211618}" type="datetimeFigureOut">
               <a:rPr lang="en-US" smtClean="0"/>
-              <a:t>6/11/2019</a:t>
+              <a:t>6/12/2019</a:t>
             </a:fld>
             <a:endParaRPr lang="en-US"/>
           </a:p>
@@ -2077,7 +2079,7 @@
           <a:p>
             <a:fld id="{CF7812AF-8950-4BC2-ABC0-4A6252211618}" type="datetimeFigureOut">
               <a:rPr lang="en-US" smtClean="0"/>
-              <a:t>6/11/2019</a:t>
+              <a:t>6/12/2019</a:t>
             </a:fld>
             <a:endParaRPr lang="en-US"/>
           </a:p>
@@ -2388,7 +2390,7 @@
           <a:p>
             <a:fld id="{CF7812AF-8950-4BC2-ABC0-4A6252211618}" type="datetimeFigureOut">
               <a:rPr lang="en-US" smtClean="0"/>
-              <a:t>6/11/2019</a:t>
+              <a:t>6/12/2019</a:t>
             </a:fld>
             <a:endParaRPr lang="en-US"/>
           </a:p>
@@ -2676,7 +2678,7 @@
           <a:p>
             <a:fld id="{CF7812AF-8950-4BC2-ABC0-4A6252211618}" type="datetimeFigureOut">
               <a:rPr lang="en-US" smtClean="0"/>
-              <a:t>6/11/2019</a:t>
+              <a:t>6/12/2019</a:t>
             </a:fld>
             <a:endParaRPr lang="en-US"/>
           </a:p>
@@ -2917,7 +2919,7 @@
           <a:p>
             <a:fld id="{CF7812AF-8950-4BC2-ABC0-4A6252211618}" type="datetimeFigureOut">
               <a:rPr lang="en-US" smtClean="0"/>
-              <a:t>6/11/2019</a:t>
+              <a:t>6/12/2019</a:t>
             </a:fld>
             <a:endParaRPr lang="en-US"/>
           </a:p>
@@ -3697,6 +3699,205 @@
 </p:sld>
 </file>
 
+<file path=ppt/slides/slide10.xml><?xml version="1.0" encoding="utf-8"?>
+<p:sld xmlns:a="http://schemas.openxmlformats.org/drawingml/2006/main" xmlns:r="http://schemas.openxmlformats.org/officeDocument/2006/relationships" xmlns:p="http://schemas.openxmlformats.org/presentationml/2006/main">
+  <p:cSld>
+    <p:spTree>
+      <p:nvGrpSpPr>
+        <p:cNvPr id="1" name=""/>
+        <p:cNvGrpSpPr/>
+        <p:nvPr/>
+      </p:nvGrpSpPr>
+      <p:grpSpPr>
+        <a:xfrm>
+          <a:off x="0" y="0"/>
+          <a:ext cx="0" cy="0"/>
+          <a:chOff x="0" y="0"/>
+          <a:chExt cx="0" cy="0"/>
+        </a:xfrm>
+      </p:grpSpPr>
+      <p:sp>
+        <p:nvSpPr>
+          <p:cNvPr id="2" name="Title 1">
+            <a:extLst>
+              <a:ext uri="{FF2B5EF4-FFF2-40B4-BE49-F238E27FC236}">
+                <a16:creationId xmlns:a16="http://schemas.microsoft.com/office/drawing/2014/main" id="{4F93D9A0-A472-4F1E-A7C5-D8517879CC93}"/>
+              </a:ext>
+            </a:extLst>
+          </p:cNvPr>
+          <p:cNvSpPr>
+            <a:spLocks noGrp="1"/>
+          </p:cNvSpPr>
+          <p:nvPr>
+            <p:ph type="title"/>
+          </p:nvPr>
+        </p:nvSpPr>
+        <p:spPr/>
+        <p:txBody>
+          <a:bodyPr/>
+          <a:lstStyle/>
+          <a:p>
+            <a:r>
+              <a:rPr lang="en-US" dirty="0"/>
+              <a:t>Thank you!</a:t>
+            </a:r>
+          </a:p>
+        </p:txBody>
+      </p:sp>
+      <p:sp>
+        <p:nvSpPr>
+          <p:cNvPr id="3" name="Content Placeholder 2">
+            <a:extLst>
+              <a:ext uri="{FF2B5EF4-FFF2-40B4-BE49-F238E27FC236}">
+                <a16:creationId xmlns:a16="http://schemas.microsoft.com/office/drawing/2014/main" id="{DB510860-160E-4EFE-83B8-859D954B64A4}"/>
+              </a:ext>
+            </a:extLst>
+          </p:cNvPr>
+          <p:cNvSpPr>
+            <a:spLocks noGrp="1"/>
+          </p:cNvSpPr>
+          <p:nvPr>
+            <p:ph idx="1"/>
+          </p:nvPr>
+        </p:nvSpPr>
+        <p:spPr/>
+        <p:txBody>
+          <a:bodyPr/>
+          <a:lstStyle/>
+          <a:p>
+            <a:r>
+              <a:rPr lang="en-US" sz="2400" u="sng" dirty="0"/>
+              <a:t>Flatiron School – Data Science Bootcamp </a:t>
+            </a:r>
+          </a:p>
+          <a:p>
+            <a:pPr lvl="1"/>
+            <a:r>
+              <a:rPr lang="en-US" sz="2000" dirty="0"/>
+              <a:t>Brandon Lewis – Instructor </a:t>
+            </a:r>
+          </a:p>
+          <a:p>
+            <a:pPr lvl="1"/>
+            <a:r>
+              <a:rPr lang="en-US" sz="2000" dirty="0"/>
+              <a:t>Jeff Herman – Advisor</a:t>
+            </a:r>
+          </a:p>
+          <a:p>
+            <a:r>
+              <a:rPr lang="en-US" dirty="0"/>
+              <a:t>FiveThirtyEight – supplying troll tweet dataset</a:t>
+            </a:r>
+          </a:p>
+          <a:p>
+            <a:endParaRPr lang="en-US" dirty="0"/>
+          </a:p>
+        </p:txBody>
+      </p:sp>
+    </p:spTree>
+    <p:extLst>
+      <p:ext uri="{BB962C8B-B14F-4D97-AF65-F5344CB8AC3E}">
+        <p14:creationId xmlns:p14="http://schemas.microsoft.com/office/powerpoint/2010/main" val="2873210379"/>
+      </p:ext>
+    </p:extLst>
+  </p:cSld>
+  <p:clrMapOvr>
+    <a:masterClrMapping/>
+  </p:clrMapOvr>
+</p:sld>
+</file>
+
+<file path=ppt/slides/slide11.xml><?xml version="1.0" encoding="utf-8"?>
+<p:sld xmlns:a="http://schemas.openxmlformats.org/drawingml/2006/main" xmlns:r="http://schemas.openxmlformats.org/officeDocument/2006/relationships" xmlns:p="http://schemas.openxmlformats.org/presentationml/2006/main" show="0">
+  <p:cSld>
+    <p:spTree>
+      <p:nvGrpSpPr>
+        <p:cNvPr id="1" name=""/>
+        <p:cNvGrpSpPr/>
+        <p:nvPr/>
+      </p:nvGrpSpPr>
+      <p:grpSpPr>
+        <a:xfrm>
+          <a:off x="0" y="0"/>
+          <a:ext cx="0" cy="0"/>
+          <a:chOff x="0" y="0"/>
+          <a:chExt cx="0" cy="0"/>
+        </a:xfrm>
+      </p:grpSpPr>
+      <p:sp>
+        <p:nvSpPr>
+          <p:cNvPr id="2" name="Title 1">
+            <a:extLst>
+              <a:ext uri="{FF2B5EF4-FFF2-40B4-BE49-F238E27FC236}">
+                <a16:creationId xmlns:a16="http://schemas.microsoft.com/office/drawing/2014/main" id="{538A232C-6275-4A08-96B7-B7FC85C1CAD2}"/>
+              </a:ext>
+            </a:extLst>
+          </p:cNvPr>
+          <p:cNvSpPr>
+            <a:spLocks noGrp="1"/>
+          </p:cNvSpPr>
+          <p:nvPr>
+            <p:ph type="title"/>
+          </p:nvPr>
+        </p:nvSpPr>
+        <p:spPr/>
+        <p:txBody>
+          <a:bodyPr/>
+          <a:lstStyle/>
+          <a:p>
+            <a:endParaRPr lang="en-US"/>
+          </a:p>
+        </p:txBody>
+      </p:sp>
+      <p:pic>
+        <p:nvPicPr>
+          <p:cNvPr id="5" name="Content Placeholder 4" descr="A picture containing map&#10;&#10;Description automatically generated">
+            <a:extLst>
+              <a:ext uri="{FF2B5EF4-FFF2-40B4-BE49-F238E27FC236}">
+                <a16:creationId xmlns:a16="http://schemas.microsoft.com/office/drawing/2014/main" id="{36E99701-9D64-4D0E-B08A-3291FDE775E6}"/>
+              </a:ext>
+            </a:extLst>
+          </p:cNvPr>
+          <p:cNvPicPr>
+            <a:picLocks noGrp="1" noChangeAspect="1"/>
+          </p:cNvPicPr>
+          <p:nvPr>
+            <p:ph idx="1"/>
+          </p:nvPr>
+        </p:nvPicPr>
+        <p:blipFill>
+          <a:blip r:embed="rId2">
+            <a:extLst>
+              <a:ext uri="{28A0092B-C50C-407E-A947-70E740481C1C}">
+                <a14:useLocalDpi xmlns:a14="http://schemas.microsoft.com/office/drawing/2010/main" val="0"/>
+              </a:ext>
+            </a:extLst>
+          </a:blip>
+          <a:stretch>
+            <a:fillRect/>
+          </a:stretch>
+        </p:blipFill>
+        <p:spPr>
+          <a:xfrm>
+            <a:off x="1570559" y="824587"/>
+            <a:ext cx="9247876" cy="6033413"/>
+          </a:xfrm>
+        </p:spPr>
+      </p:pic>
+    </p:spTree>
+    <p:extLst>
+      <p:ext uri="{BB962C8B-B14F-4D97-AF65-F5344CB8AC3E}">
+        <p14:creationId xmlns:p14="http://schemas.microsoft.com/office/powerpoint/2010/main" val="2822630005"/>
+      </p:ext>
+    </p:extLst>
+  </p:cSld>
+  <p:clrMapOvr>
+    <a:masterClrMapping/>
+  </p:clrMapOvr>
+</p:sld>
+</file>
+
 <file path=ppt/slides/slide2.xml><?xml version="1.0" encoding="utf-8"?>
 <p:sld xmlns:a="http://schemas.openxmlformats.org/drawingml/2006/main" xmlns:r="http://schemas.openxmlformats.org/officeDocument/2006/relationships" xmlns:p="http://schemas.openxmlformats.org/presentationml/2006/main">
   <p:cSld>
@@ -4338,8 +4539,8 @@
           <a:lstStyle/>
           <a:p>
             <a:r>
-              <a:rPr lang="en-US" sz="4000"/>
-              <a:t>Goals &amp; Methods</a:t>
+              <a:rPr lang="en-US" sz="4000" dirty="0"/>
+              <a:t>Goals &amp; Value for Your Organization</a:t>
             </a:r>
           </a:p>
         </p:txBody>
@@ -4421,14 +4622,40 @@
         </p:spPr>
         <p:txBody>
           <a:bodyPr>
-            <a:normAutofit/>
+            <a:normAutofit fontScale="92500"/>
           </a:bodyPr>
           <a:lstStyle/>
           <a:p>
             <a:r>
-              <a:rPr lang="en-US" sz="2000" dirty="0"/>
+              <a:rPr lang="en-US" dirty="0"/>
               <a:t>Our goal is to build a machine learning model that uses Natural Language Processing alone to identity Russian Troll tweets versus authentic users.</a:t>
             </a:r>
+          </a:p>
+          <a:p>
+            <a:endParaRPr lang="en-US" dirty="0"/>
+          </a:p>
+          <a:p>
+            <a:r>
+              <a:rPr lang="en-US" dirty="0"/>
+              <a:t>Imagine an algorithm for your platform that can detect if user’s social media messages may be foreign agents.</a:t>
+            </a:r>
+          </a:p>
+          <a:p>
+            <a:pPr lvl="1"/>
+            <a:r>
+              <a:rPr lang="en-US" dirty="0"/>
+              <a:t>Get ahead of manipulation of your platform for malicious purposes.</a:t>
+            </a:r>
+          </a:p>
+          <a:p>
+            <a:pPr lvl="1"/>
+            <a:r>
+              <a:rPr lang="en-US" dirty="0"/>
+              <a:t>Avoid bad press and drops in public trust/perception.</a:t>
+            </a:r>
+          </a:p>
+          <a:p>
+            <a:endParaRPr lang="en-US" dirty="0"/>
           </a:p>
         </p:txBody>
       </p:sp>
@@ -4513,13 +4740,14 @@
           <a:p>
             <a:r>
               <a:rPr lang="en-US" dirty="0"/>
-              <a:t>We wanted to focus our analyses on the language content alone.</a:t>
+              <a:t>We wanted to focus our initial analyses on the language alone.</a:t>
             </a:r>
           </a:p>
           <a:p>
             <a:endParaRPr lang="en-US" dirty="0"/>
           </a:p>
           <a:p>
+            <a:pPr lvl="1"/>
             <a:r>
               <a:rPr lang="en-US" dirty="0"/>
               <a:t>To do so, we limited our analyses to only original-content tweets written in English, which totaled 1.4 millions tweets.</a:t>
@@ -4529,6 +4757,7 @@
             <a:endParaRPr lang="en-US" dirty="0"/>
           </a:p>
           <a:p>
+            <a:pPr lvl="1"/>
             <a:r>
               <a:rPr lang="en-US" dirty="0"/>
               <a:t>Using the Twitter API, we extracted 40,000 tweets, matching the top 40 most common @’s (mentions) and compared them to an equal-sized random sample from the 1.4 million tweets.</a:t>
@@ -5018,12 +5247,21 @@
             <p:ph type="title"/>
           </p:nvPr>
         </p:nvSpPr>
-        <p:spPr/>
+        <p:spPr>
+          <a:xfrm>
+            <a:off x="838200" y="365125"/>
+            <a:ext cx="10515600" cy="1325563"/>
+          </a:xfrm>
+        </p:spPr>
         <p:txBody>
           <a:bodyPr/>
           <a:lstStyle/>
           <a:p>
-            <a:endParaRPr lang="en-US"/>
+            <a:r>
+              <a:rPr lang="en-US"/>
+              <a:t>Our Model</a:t>
+            </a:r>
+            <a:endParaRPr lang="en-US" dirty="0"/>
           </a:p>
         </p:txBody>
       </p:sp>
@@ -5043,15 +5281,143 @@
             <p:ph idx="1"/>
           </p:nvPr>
         </p:nvSpPr>
-        <p:spPr/>
+        <p:spPr>
+          <a:xfrm>
+            <a:off x="838200" y="1825625"/>
+            <a:ext cx="5975838" cy="4351338"/>
+          </a:xfrm>
+        </p:spPr>
         <p:txBody>
           <a:bodyPr/>
           <a:lstStyle/>
           <a:p>
-            <a:endParaRPr lang="en-US" dirty="0"/>
-          </a:p>
-        </p:txBody>
-      </p:sp>
+            <a:r>
+              <a:rPr lang="en-US" dirty="0"/>
+              <a:t>Using multiple machine-learning models, including artificial neural networks, we can predict Russian troll tweets:</a:t>
+            </a:r>
+          </a:p>
+          <a:p>
+            <a:pPr lvl="1"/>
+            <a:r>
+              <a:rPr lang="en-US" dirty="0"/>
+              <a:t>With 88-93% accuracy in 78 ms using logistic regression.</a:t>
+            </a:r>
+          </a:p>
+          <a:p>
+            <a:pPr lvl="1"/>
+            <a:r>
+              <a:rPr lang="en-US" dirty="0"/>
+              <a:t>With 89-99% accuracy in 31 sec using artificial neural networks.</a:t>
+            </a:r>
+          </a:p>
+        </p:txBody>
+      </p:sp>
+      <p:grpSp>
+        <p:nvGrpSpPr>
+          <p:cNvPr id="7" name="Group 6">
+            <a:extLst>
+              <a:ext uri="{FF2B5EF4-FFF2-40B4-BE49-F238E27FC236}">
+                <a16:creationId xmlns:a16="http://schemas.microsoft.com/office/drawing/2014/main" id="{675B75C4-42F7-4291-82BA-F06034BB72A4}"/>
+              </a:ext>
+            </a:extLst>
+          </p:cNvPr>
+          <p:cNvGrpSpPr/>
+          <p:nvPr/>
+        </p:nvGrpSpPr>
+        <p:grpSpPr>
+          <a:xfrm>
+            <a:off x="7008935" y="365125"/>
+            <a:ext cx="4914900" cy="5976938"/>
+            <a:chOff x="6648450" y="681037"/>
+            <a:chExt cx="4914900" cy="5976938"/>
+          </a:xfrm>
+        </p:grpSpPr>
+        <p:sp>
+          <p:nvSpPr>
+            <p:cNvPr id="6" name="Rectangle 5">
+              <a:extLst>
+                <a:ext uri="{FF2B5EF4-FFF2-40B4-BE49-F238E27FC236}">
+                  <a16:creationId xmlns:a16="http://schemas.microsoft.com/office/drawing/2014/main" id="{FF94E685-1A2E-418B-B593-A8B829E5B2A3}"/>
+                </a:ext>
+              </a:extLst>
+            </p:cNvPr>
+            <p:cNvSpPr/>
+            <p:nvPr/>
+          </p:nvSpPr>
+          <p:spPr>
+            <a:xfrm>
+              <a:off x="6648450" y="681037"/>
+              <a:ext cx="4914900" cy="5976938"/>
+            </a:xfrm>
+            <a:prstGeom prst="rect">
+              <a:avLst/>
+            </a:prstGeom>
+            <a:solidFill>
+              <a:schemeClr val="tx1"/>
+            </a:solidFill>
+          </p:spPr>
+          <p:style>
+            <a:lnRef idx="2">
+              <a:schemeClr val="accent1">
+                <a:shade val="50000"/>
+              </a:schemeClr>
+            </a:lnRef>
+            <a:fillRef idx="1">
+              <a:schemeClr val="accent1"/>
+            </a:fillRef>
+            <a:effectRef idx="0">
+              <a:schemeClr val="accent1"/>
+            </a:effectRef>
+            <a:fontRef idx="minor">
+              <a:schemeClr val="lt1"/>
+            </a:fontRef>
+          </p:style>
+          <p:txBody>
+            <a:bodyPr rtlCol="0" anchor="ctr"/>
+            <a:lstStyle/>
+            <a:p>
+              <a:pPr algn="ctr"/>
+              <a:endParaRPr lang="en-US"/>
+            </a:p>
+          </p:txBody>
+        </p:sp>
+        <p:pic>
+          <p:nvPicPr>
+            <p:cNvPr id="5" name="Picture 4" descr="A screenshot of a cell phone&#10;&#10;Description automatically generated">
+              <a:extLst>
+                <a:ext uri="{FF2B5EF4-FFF2-40B4-BE49-F238E27FC236}">
+                  <a16:creationId xmlns:a16="http://schemas.microsoft.com/office/drawing/2014/main" id="{60F8E207-D9E9-4F1E-8902-5AF7281C361A}"/>
+                </a:ext>
+              </a:extLst>
+            </p:cNvPr>
+            <p:cNvPicPr>
+              <a:picLocks noChangeAspect="1"/>
+            </p:cNvPicPr>
+            <p:nvPr/>
+          </p:nvPicPr>
+          <p:blipFill>
+            <a:blip r:embed="rId2">
+              <a:extLst>
+                <a:ext uri="{28A0092B-C50C-407E-A947-70E740481C1C}">
+                  <a14:useLocalDpi xmlns:a14="http://schemas.microsoft.com/office/drawing/2010/main" val="0"/>
+                </a:ext>
+              </a:extLst>
+            </a:blip>
+            <a:stretch>
+              <a:fillRect/>
+            </a:stretch>
+          </p:blipFill>
+          <p:spPr>
+            <a:xfrm>
+              <a:off x="6709444" y="681037"/>
+              <a:ext cx="4839803" cy="5957657"/>
+            </a:xfrm>
+            <a:prstGeom prst="rect">
+              <a:avLst/>
+            </a:prstGeom>
+          </p:spPr>
+        </p:pic>
+      </p:grpSp>
     </p:spTree>
     <p:extLst>
       <p:ext uri="{BB962C8B-B14F-4D97-AF65-F5344CB8AC3E}">
@@ -5087,7 +5453,7 @@
           <p:cNvPr id="2" name="Title 1">
             <a:extLst>
               <a:ext uri="{FF2B5EF4-FFF2-40B4-BE49-F238E27FC236}">
-                <a16:creationId xmlns:a16="http://schemas.microsoft.com/office/drawing/2014/main" id="{538A232C-6275-4A08-96B7-B7FC85C1CAD2}"/>
+                <a16:creationId xmlns:a16="http://schemas.microsoft.com/office/drawing/2014/main" id="{D8ABFE92-CA9C-4311-8F64-0CF5962F3B9A}"/>
               </a:ext>
             </a:extLst>
           </p:cNvPr>
@@ -5103,49 +5469,62 @@
           <a:bodyPr/>
           <a:lstStyle/>
           <a:p>
-            <a:endParaRPr lang="en-US"/>
-          </a:p>
-        </p:txBody>
-      </p:sp>
-      <p:pic>
-        <p:nvPicPr>
-          <p:cNvPr id="5" name="Content Placeholder 4" descr="A picture containing map&#10;&#10;Description automatically generated">
-            <a:extLst>
-              <a:ext uri="{FF2B5EF4-FFF2-40B4-BE49-F238E27FC236}">
-                <a16:creationId xmlns:a16="http://schemas.microsoft.com/office/drawing/2014/main" id="{36E99701-9D64-4D0E-B08A-3291FDE775E6}"/>
-              </a:ext>
-            </a:extLst>
-          </p:cNvPr>
-          <p:cNvPicPr>
-            <a:picLocks noGrp="1" noChangeAspect="1"/>
-          </p:cNvPicPr>
+            <a:r>
+              <a:rPr lang="en-US" dirty="0"/>
+              <a:t>Future Directions</a:t>
+            </a:r>
+          </a:p>
+        </p:txBody>
+      </p:sp>
+      <p:sp>
+        <p:nvSpPr>
+          <p:cNvPr id="3" name="Content Placeholder 2">
+            <a:extLst>
+              <a:ext uri="{FF2B5EF4-FFF2-40B4-BE49-F238E27FC236}">
+                <a16:creationId xmlns:a16="http://schemas.microsoft.com/office/drawing/2014/main" id="{88360C4A-A8BF-4F0D-A0D0-D7C0086BC976}"/>
+              </a:ext>
+            </a:extLst>
+          </p:cNvPr>
+          <p:cNvSpPr>
+            <a:spLocks noGrp="1"/>
+          </p:cNvSpPr>
           <p:nvPr>
             <p:ph idx="1"/>
           </p:nvPr>
-        </p:nvPicPr>
-        <p:blipFill>
-          <a:blip r:embed="rId2">
-            <a:extLst>
-              <a:ext uri="{28A0092B-C50C-407E-A947-70E740481C1C}">
-                <a14:useLocalDpi xmlns:a14="http://schemas.microsoft.com/office/drawing/2010/main" val="0"/>
-              </a:ext>
-            </a:extLst>
-          </a:blip>
-          <a:stretch>
-            <a:fillRect/>
-          </a:stretch>
-        </p:blipFill>
-        <p:spPr>
-          <a:xfrm>
-            <a:off x="1570559" y="824587"/>
-            <a:ext cx="9247876" cy="6033413"/>
-          </a:xfrm>
-        </p:spPr>
-      </p:pic>
+        </p:nvSpPr>
+        <p:spPr/>
+        <p:txBody>
+          <a:bodyPr/>
+          <a:lstStyle/>
+          <a:p>
+            <a:r>
+              <a:rPr lang="en-US" dirty="0"/>
+              <a:t>By granting our organization Enterprise-level Twitter API access, we can provide even better predictive capabilities equipped with batch historical tweets.</a:t>
+            </a:r>
+          </a:p>
+          <a:p>
+            <a:r>
+              <a:rPr lang="en-US" dirty="0"/>
+              <a:t>We can build models upon our Natural Language Processing models to use our initial predictions combined with additional descriptive statistics. </a:t>
+            </a:r>
+          </a:p>
+          <a:p>
+            <a:r>
+              <a:rPr lang="en-US" dirty="0"/>
+              <a:t>We can produce more sophisticated neural networks to provide better </a:t>
+            </a:r>
+            <a:r>
+              <a:rPr lang="en-US"/>
+              <a:t>long-term analyses.</a:t>
+            </a:r>
+            <a:endParaRPr lang="en-US" dirty="0"/>
+          </a:p>
+        </p:txBody>
+      </p:sp>
     </p:spTree>
     <p:extLst>
       <p:ext uri="{BB962C8B-B14F-4D97-AF65-F5344CB8AC3E}">
-        <p14:creationId xmlns:p14="http://schemas.microsoft.com/office/powerpoint/2010/main" val="2822630005"/>
+        <p14:creationId xmlns:p14="http://schemas.microsoft.com/office/powerpoint/2010/main" val="3751182498"/>
       </p:ext>
     </p:extLst>
   </p:cSld>

</xml_diff>

<commit_message>
Added blog post notebook
</commit_message>
<xml_diff>
--- a/presentation.pptx
+++ b/presentation.pptx
@@ -10,12 +10,13 @@
     <p:sldId id="258" r:id="rId4"/>
     <p:sldId id="259" r:id="rId5"/>
     <p:sldId id="260" r:id="rId6"/>
-    <p:sldId id="261" r:id="rId7"/>
-    <p:sldId id="262" r:id="rId8"/>
-    <p:sldId id="264" r:id="rId9"/>
-    <p:sldId id="265" r:id="rId10"/>
-    <p:sldId id="266" r:id="rId11"/>
-    <p:sldId id="263" r:id="rId12"/>
+    <p:sldId id="267" r:id="rId7"/>
+    <p:sldId id="261" r:id="rId8"/>
+    <p:sldId id="262" r:id="rId9"/>
+    <p:sldId id="264" r:id="rId10"/>
+    <p:sldId id="265" r:id="rId11"/>
+    <p:sldId id="266" r:id="rId12"/>
+    <p:sldId id="263" r:id="rId13"/>
   </p:sldIdLst>
   <p:sldSz cx="12192000" cy="6858000"/>
   <p:notesSz cx="6858000" cy="9144000"/>
@@ -3721,6 +3722,109 @@
           <p:cNvPr id="2" name="Title 1">
             <a:extLst>
               <a:ext uri="{FF2B5EF4-FFF2-40B4-BE49-F238E27FC236}">
+                <a16:creationId xmlns:a16="http://schemas.microsoft.com/office/drawing/2014/main" id="{D8ABFE92-CA9C-4311-8F64-0CF5962F3B9A}"/>
+              </a:ext>
+            </a:extLst>
+          </p:cNvPr>
+          <p:cNvSpPr>
+            <a:spLocks noGrp="1"/>
+          </p:cNvSpPr>
+          <p:nvPr>
+            <p:ph type="title"/>
+          </p:nvPr>
+        </p:nvSpPr>
+        <p:spPr/>
+        <p:txBody>
+          <a:bodyPr/>
+          <a:lstStyle/>
+          <a:p>
+            <a:r>
+              <a:rPr lang="en-US" dirty="0"/>
+              <a:t>Future Directions</a:t>
+            </a:r>
+          </a:p>
+        </p:txBody>
+      </p:sp>
+      <p:sp>
+        <p:nvSpPr>
+          <p:cNvPr id="3" name="Content Placeholder 2">
+            <a:extLst>
+              <a:ext uri="{FF2B5EF4-FFF2-40B4-BE49-F238E27FC236}">
+                <a16:creationId xmlns:a16="http://schemas.microsoft.com/office/drawing/2014/main" id="{88360C4A-A8BF-4F0D-A0D0-D7C0086BC976}"/>
+              </a:ext>
+            </a:extLst>
+          </p:cNvPr>
+          <p:cNvSpPr>
+            <a:spLocks noGrp="1"/>
+          </p:cNvSpPr>
+          <p:nvPr>
+            <p:ph idx="1"/>
+          </p:nvPr>
+        </p:nvSpPr>
+        <p:spPr/>
+        <p:txBody>
+          <a:bodyPr/>
+          <a:lstStyle/>
+          <a:p>
+            <a:r>
+              <a:rPr lang="en-US" dirty="0"/>
+              <a:t>By granting our organization Enterprise-level Twitter API access, we can provide even better predictive capabilities equipped with batch historical tweets.</a:t>
+            </a:r>
+          </a:p>
+          <a:p>
+            <a:r>
+              <a:rPr lang="en-US" dirty="0"/>
+              <a:t>We can build models upon our Natural Language Processing models to use our initial predictions combined with additional descriptive statistics. </a:t>
+            </a:r>
+          </a:p>
+          <a:p>
+            <a:r>
+              <a:rPr lang="en-US" dirty="0"/>
+              <a:t>We can produce more sophisticated neural networks to provide better </a:t>
+            </a:r>
+            <a:r>
+              <a:rPr lang="en-US"/>
+              <a:t>long-term analyses.</a:t>
+            </a:r>
+            <a:endParaRPr lang="en-US" dirty="0"/>
+          </a:p>
+        </p:txBody>
+      </p:sp>
+    </p:spTree>
+    <p:extLst>
+      <p:ext uri="{BB962C8B-B14F-4D97-AF65-F5344CB8AC3E}">
+        <p14:creationId xmlns:p14="http://schemas.microsoft.com/office/powerpoint/2010/main" val="3751182498"/>
+      </p:ext>
+    </p:extLst>
+  </p:cSld>
+  <p:clrMapOvr>
+    <a:masterClrMapping/>
+  </p:clrMapOvr>
+</p:sld>
+</file>
+
+<file path=ppt/slides/slide11.xml><?xml version="1.0" encoding="utf-8"?>
+<p:sld xmlns:a="http://schemas.openxmlformats.org/drawingml/2006/main" xmlns:r="http://schemas.openxmlformats.org/officeDocument/2006/relationships" xmlns:p="http://schemas.openxmlformats.org/presentationml/2006/main">
+  <p:cSld>
+    <p:spTree>
+      <p:nvGrpSpPr>
+        <p:cNvPr id="1" name=""/>
+        <p:cNvGrpSpPr/>
+        <p:nvPr/>
+      </p:nvGrpSpPr>
+      <p:grpSpPr>
+        <a:xfrm>
+          <a:off x="0" y="0"/>
+          <a:ext cx="0" cy="0"/>
+          <a:chOff x="0" y="0"/>
+          <a:chExt cx="0" cy="0"/>
+        </a:xfrm>
+      </p:grpSpPr>
+      <p:sp>
+        <p:nvSpPr>
+          <p:cNvPr id="2" name="Title 1">
+            <a:extLst>
+              <a:ext uri="{FF2B5EF4-FFF2-40B4-BE49-F238E27FC236}">
                 <a16:creationId xmlns:a16="http://schemas.microsoft.com/office/drawing/2014/main" id="{4F93D9A0-A472-4F1E-A7C5-D8517879CC93}"/>
               </a:ext>
             </a:extLst>
@@ -3788,6 +3892,27 @@
             <a:r>
               <a:rPr lang="en-US" dirty="0"/>
               <a:t>FiveThirtyEight – supplying troll tweet dataset</a:t>
+            </a:r>
+          </a:p>
+          <a:p>
+            <a:r>
+              <a:rPr lang="en-US" dirty="0"/>
+              <a:t>Dr. Darren </a:t>
+            </a:r>
+            <a:r>
+              <a:rPr lang="en-US" dirty="0" err="1"/>
+              <a:t>Linvill</a:t>
+            </a:r>
+            <a:r>
+              <a:rPr lang="en-US" dirty="0"/>
+              <a:t> and Dr. Patrick Warren from Clemson University:</a:t>
+            </a:r>
+          </a:p>
+          <a:p>
+            <a:pPr lvl="1"/>
+            <a:r>
+              <a:rPr lang="en-US" dirty="0"/>
+              <a:t>Initial harvesting and analyses on Russian troll tweets</a:t>
             </a:r>
           </a:p>
           <a:p>
@@ -3808,7 +3933,7 @@
 </p:sld>
 </file>
 
-<file path=ppt/slides/slide11.xml><?xml version="1.0" encoding="utf-8"?>
+<file path=ppt/slides/slide12.xml><?xml version="1.0" encoding="utf-8"?>
 <p:sld xmlns:a="http://schemas.openxmlformats.org/drawingml/2006/main" xmlns:r="http://schemas.openxmlformats.org/officeDocument/2006/relationships" xmlns:p="http://schemas.openxmlformats.org/presentationml/2006/main" show="0">
   <p:cSld>
     <p:spTree>
@@ -4909,10 +5034,7 @@
     <p:bg>
       <p:bgPr>
         <a:solidFill>
-          <a:schemeClr val="bg1">
-            <a:tint val="95000"/>
-            <a:satMod val="170000"/>
-          </a:schemeClr>
+          <a:schemeClr val="bg1"/>
         </a:solidFill>
         <a:effectLst/>
       </p:bgPr>
@@ -4933,61 +5055,190 @@
       </p:grpSpPr>
       <p:sp>
         <p:nvSpPr>
-          <p:cNvPr id="2" name="Title 1">
-            <a:extLst>
-              <a:ext uri="{FF2B5EF4-FFF2-40B4-BE49-F238E27FC236}">
-                <a16:creationId xmlns:a16="http://schemas.microsoft.com/office/drawing/2014/main" id="{6E2F331F-229F-4AC6-9627-2A2836703E5E}"/>
-              </a:ext>
-            </a:extLst>
-          </p:cNvPr>
-          <p:cNvSpPr>
-            <a:spLocks noGrp="1"/>
-          </p:cNvSpPr>
-          <p:nvPr>
-            <p:ph type="title"/>
+          <p:cNvPr id="9" name="Rectangle 8">
+            <a:extLst>
+              <a:ext uri="{FF2B5EF4-FFF2-40B4-BE49-F238E27FC236}">
+                <a16:creationId xmlns:a16="http://schemas.microsoft.com/office/drawing/2014/main" id="{6753252F-4873-4F63-801D-CC719279A7D5}"/>
+              </a:ext>
+              <a:ext uri="{C183D7F6-B498-43B3-948B-1728B52AA6E4}">
+                <adec:decorative xmlns:adec="http://schemas.microsoft.com/office/drawing/2017/decorative" val="1"/>
+              </a:ext>
+            </a:extLst>
+          </p:cNvPr>
+          <p:cNvSpPr>
+            <a:spLocks noGrp="1" noRot="1" noChangeAspect="1" noMove="1" noResize="1" noEditPoints="1" noAdjustHandles="1" noChangeArrowheads="1" noChangeShapeType="1" noTextEdit="1"/>
+          </p:cNvSpPr>
+          <p:nvPr>
+            <p:extLst>
+              <p:ext uri="{386F3935-93C4-4BCD-93E2-E3B085C9AB24}">
+                <p16:designElem xmlns:p16="http://schemas.microsoft.com/office/powerpoint/2015/main" val="1"/>
+              </p:ext>
+            </p:extLst>
           </p:nvPr>
         </p:nvSpPr>
         <p:spPr>
           <a:xfrm>
-            <a:off x="694510" y="1487272"/>
-            <a:ext cx="2743200" cy="2743200"/>
+            <a:off x="0" y="0"/>
+            <a:ext cx="12192000" cy="6858000"/>
+          </a:xfrm>
+          <a:prstGeom prst="rect">
+            <a:avLst/>
+          </a:prstGeom>
+          <a:solidFill>
+            <a:srgbClr val="FFFFFF"/>
+          </a:solidFill>
+          <a:ln>
+            <a:noFill/>
+          </a:ln>
+        </p:spPr>
+        <p:style>
+          <a:lnRef idx="2">
+            <a:schemeClr val="accent1">
+              <a:shade val="50000"/>
+            </a:schemeClr>
+          </a:lnRef>
+          <a:fillRef idx="1">
+            <a:schemeClr val="accent1"/>
+          </a:fillRef>
+          <a:effectRef idx="0">
+            <a:schemeClr val="accent1"/>
+          </a:effectRef>
+          <a:fontRef idx="minor">
+            <a:schemeClr val="lt1"/>
+          </a:fontRef>
+        </p:style>
+        <p:txBody>
+          <a:bodyPr rtlCol="0" anchor="ctr"/>
+          <a:lstStyle/>
+          <a:p>
+            <a:pPr algn="ctr"/>
+            <a:endParaRPr lang="en-US"/>
+          </a:p>
+        </p:txBody>
+      </p:sp>
+      <p:sp>
+        <p:nvSpPr>
+          <p:cNvPr id="11" name="Rectangle 10">
+            <a:extLst>
+              <a:ext uri="{FF2B5EF4-FFF2-40B4-BE49-F238E27FC236}">
+                <a16:creationId xmlns:a16="http://schemas.microsoft.com/office/drawing/2014/main" id="{047C8CCB-F95D-4249-92DD-651249D3535A}"/>
+              </a:ext>
+              <a:ext uri="{C183D7F6-B498-43B3-948B-1728B52AA6E4}">
+                <adec:decorative xmlns:adec="http://schemas.microsoft.com/office/drawing/2017/decorative" val="1"/>
+              </a:ext>
+            </a:extLst>
+          </p:cNvPr>
+          <p:cNvSpPr>
+            <a:spLocks noGrp="1" noRot="1" noChangeAspect="1" noMove="1" noResize="1" noEditPoints="1" noAdjustHandles="1" noChangeArrowheads="1" noChangeShapeType="1" noTextEdit="1"/>
+          </p:cNvSpPr>
+          <p:nvPr>
+            <p:extLst>
+              <p:ext uri="{386F3935-93C4-4BCD-93E2-E3B085C9AB24}">
+                <p16:designElem xmlns:p16="http://schemas.microsoft.com/office/powerpoint/2015/main" val="1"/>
+              </p:ext>
+            </p:extLst>
+          </p:nvPr>
+        </p:nvSpPr>
+        <p:spPr>
+          <a:xfrm>
+            <a:off x="0" y="0"/>
+            <a:ext cx="2013557" cy="6858000"/>
+          </a:xfrm>
+          <a:prstGeom prst="rect">
+            <a:avLst/>
+          </a:prstGeom>
+          <a:solidFill>
+            <a:srgbClr val="7F7F7F"/>
+          </a:solidFill>
+          <a:ln>
+            <a:noFill/>
+          </a:ln>
+        </p:spPr>
+        <p:style>
+          <a:lnRef idx="2">
+            <a:schemeClr val="accent1">
+              <a:shade val="50000"/>
+            </a:schemeClr>
+          </a:lnRef>
+          <a:fillRef idx="1">
+            <a:schemeClr val="accent1"/>
+          </a:fillRef>
+          <a:effectRef idx="0">
+            <a:schemeClr val="accent1"/>
+          </a:effectRef>
+          <a:fontRef idx="minor">
+            <a:schemeClr val="lt1"/>
+          </a:fontRef>
+        </p:style>
+        <p:txBody>
+          <a:bodyPr rtlCol="0" anchor="ctr"/>
+          <a:lstStyle/>
+          <a:p>
+            <a:pPr algn="ctr"/>
+            <a:endParaRPr lang="en-US"/>
+          </a:p>
+        </p:txBody>
+      </p:sp>
+      <p:sp>
+        <p:nvSpPr>
+          <p:cNvPr id="2" name="Title 1">
+            <a:extLst>
+              <a:ext uri="{FF2B5EF4-FFF2-40B4-BE49-F238E27FC236}">
+                <a16:creationId xmlns:a16="http://schemas.microsoft.com/office/drawing/2014/main" id="{B6FF39BA-2226-4AB0-A4A9-5431A04ACE5F}"/>
+              </a:ext>
+            </a:extLst>
+          </p:cNvPr>
+          <p:cNvSpPr>
+            <a:spLocks noGrp="1"/>
+          </p:cNvSpPr>
+          <p:nvPr>
+            <p:ph type="title"/>
+          </p:nvPr>
+        </p:nvSpPr>
+        <p:spPr>
+          <a:xfrm>
+            <a:off x="640080" y="2074363"/>
+            <a:ext cx="2752354" cy="2709275"/>
           </a:xfrm>
           <a:prstGeom prst="ellipse">
             <a:avLst/>
           </a:prstGeom>
           <a:solidFill>
-            <a:srgbClr val="7B7B7B"/>
+            <a:srgbClr val="262626"/>
           </a:solidFill>
           <a:ln w="174625" cmpd="thinThick">
             <a:solidFill>
-              <a:srgbClr val="7B7B7B"/>
+              <a:srgbClr val="262626"/>
             </a:solidFill>
           </a:ln>
         </p:spPr>
         <p:txBody>
-          <a:bodyPr>
+          <a:bodyPr vert="horz" lIns="91440" tIns="45720" rIns="91440" bIns="45720" rtlCol="0" anchor="ctr">
             <a:normAutofit/>
           </a:bodyPr>
           <a:lstStyle/>
           <a:p>
             <a:pPr algn="ctr"/>
             <a:r>
-              <a:rPr lang="en-US" sz="2600">
+              <a:rPr lang="en-US" sz="2600" kern="1200">
                 <a:solidFill>
                   <a:srgbClr val="FFFFFF"/>
                 </a:solidFill>
+                <a:latin typeface="+mj-lt"/>
+                <a:ea typeface="+mj-ea"/>
+                <a:cs typeface="+mj-cs"/>
               </a:rPr>
-              <a:t>Most Common Hashtags</a:t>
+              <a:t>Most Frequently Used Words</a:t>
             </a:r>
           </a:p>
         </p:txBody>
       </p:sp>
       <p:pic>
         <p:nvPicPr>
-          <p:cNvPr id="6" name="Picture 5">
-            <a:extLst>
-              <a:ext uri="{FF2B5EF4-FFF2-40B4-BE49-F238E27FC236}">
-                <a16:creationId xmlns:a16="http://schemas.microsoft.com/office/drawing/2014/main" id="{81DA2904-F711-4FB5-B649-556EBBE31B76}"/>
+          <p:cNvPr id="4" name="Picture 3" descr="A picture containing tennis&#10;&#10;Description automatically generated">
+            <a:extLst>
+              <a:ext uri="{FF2B5EF4-FFF2-40B4-BE49-F238E27FC236}">
+                <a16:creationId xmlns:a16="http://schemas.microsoft.com/office/drawing/2014/main" id="{7E80B148-5BA8-4717-A4E3-76F53A6AEC22}"/>
               </a:ext>
             </a:extLst>
           </p:cNvPr>
@@ -4997,57 +5248,67 @@
           <p:nvPr/>
         </p:nvPicPr>
         <p:blipFill>
-          <a:blip r:embed="rId2"/>
+          <a:blip r:embed="rId2">
+            <a:extLst>
+              <a:ext uri="{28A0092B-C50C-407E-A947-70E740481C1C}">
+                <a14:useLocalDpi xmlns:a14="http://schemas.microsoft.com/office/drawing/2010/main" val="0"/>
+              </a:ext>
+            </a:extLst>
+          </a:blip>
           <a:stretch>
             <a:fillRect/>
           </a:stretch>
         </p:blipFill>
         <p:spPr>
           <a:xfrm>
-            <a:off x="3682999" y="839514"/>
-            <a:ext cx="7899400" cy="5272851"/>
+            <a:off x="4495801" y="81515"/>
+            <a:ext cx="5292468" cy="3347485"/>
           </a:xfrm>
           <a:prstGeom prst="rect">
             <a:avLst/>
           </a:prstGeom>
         </p:spPr>
       </p:pic>
-      <p:sp>
-        <p:nvSpPr>
-          <p:cNvPr id="4" name="Content Placeholder 3">
-            <a:extLst>
-              <a:ext uri="{FF2B5EF4-FFF2-40B4-BE49-F238E27FC236}">
-                <a16:creationId xmlns:a16="http://schemas.microsoft.com/office/drawing/2014/main" id="{6196D1A6-CF61-4F02-A623-202D82450072}"/>
-              </a:ext>
-            </a:extLst>
-          </p:cNvPr>
-          <p:cNvSpPr>
-            <a:spLocks noGrp="1"/>
-          </p:cNvSpPr>
-          <p:nvPr>
-            <p:ph idx="1"/>
-          </p:nvPr>
-        </p:nvSpPr>
+      <p:pic>
+        <p:nvPicPr>
+          <p:cNvPr id="6" name="Picture 5">
+            <a:extLst>
+              <a:ext uri="{FF2B5EF4-FFF2-40B4-BE49-F238E27FC236}">
+                <a16:creationId xmlns:a16="http://schemas.microsoft.com/office/drawing/2014/main" id="{F5E696E7-8965-47AA-BAA4-0F192592C28A}"/>
+              </a:ext>
+            </a:extLst>
+          </p:cNvPr>
+          <p:cNvPicPr>
+            <a:picLocks noChangeAspect="1"/>
+          </p:cNvPicPr>
+          <p:nvPr/>
+        </p:nvPicPr>
+        <p:blipFill>
+          <a:blip r:embed="rId3">
+            <a:extLst>
+              <a:ext uri="{28A0092B-C50C-407E-A947-70E740481C1C}">
+                <a14:useLocalDpi xmlns:a14="http://schemas.microsoft.com/office/drawing/2010/main" val="0"/>
+              </a:ext>
+            </a:extLst>
+          </a:blip>
+          <a:stretch>
+            <a:fillRect/>
+          </a:stretch>
+        </p:blipFill>
         <p:spPr>
           <a:xfrm>
-            <a:off x="4038600" y="4632543"/>
-            <a:ext cx="7188199" cy="1479822"/>
+            <a:off x="4573813" y="3510516"/>
+            <a:ext cx="5239296" cy="3250558"/>
           </a:xfrm>
+          <a:prstGeom prst="rect">
+            <a:avLst/>
+          </a:prstGeom>
         </p:spPr>
-        <p:txBody>
-          <a:bodyPr>
-            <a:normAutofit/>
-          </a:bodyPr>
-          <a:lstStyle/>
-          <a:p>
-            <a:endParaRPr lang="en-US" sz="1800"/>
-          </a:p>
-        </p:txBody>
-      </p:sp>
+      </p:pic>
     </p:spTree>
     <p:extLst>
       <p:ext uri="{BB962C8B-B14F-4D97-AF65-F5344CB8AC3E}">
-        <p14:creationId xmlns:p14="http://schemas.microsoft.com/office/powerpoint/2010/main" val="1425757719"/>
+        <p14:creationId xmlns:p14="http://schemas.microsoft.com/office/powerpoint/2010/main" val="1006690205"/>
       </p:ext>
     </p:extLst>
   </p:cSld>
@@ -5090,6 +5351,160 @@
           <p:cNvPr id="2" name="Title 1">
             <a:extLst>
               <a:ext uri="{FF2B5EF4-FFF2-40B4-BE49-F238E27FC236}">
+                <a16:creationId xmlns:a16="http://schemas.microsoft.com/office/drawing/2014/main" id="{6E2F331F-229F-4AC6-9627-2A2836703E5E}"/>
+              </a:ext>
+            </a:extLst>
+          </p:cNvPr>
+          <p:cNvSpPr>
+            <a:spLocks noGrp="1"/>
+          </p:cNvSpPr>
+          <p:nvPr>
+            <p:ph type="title"/>
+          </p:nvPr>
+        </p:nvSpPr>
+        <p:spPr>
+          <a:xfrm>
+            <a:off x="694510" y="1487272"/>
+            <a:ext cx="2743200" cy="2743200"/>
+          </a:xfrm>
+          <a:prstGeom prst="ellipse">
+            <a:avLst/>
+          </a:prstGeom>
+          <a:solidFill>
+            <a:srgbClr val="7B7B7B"/>
+          </a:solidFill>
+          <a:ln w="174625" cmpd="thinThick">
+            <a:solidFill>
+              <a:srgbClr val="7B7B7B"/>
+            </a:solidFill>
+          </a:ln>
+        </p:spPr>
+        <p:txBody>
+          <a:bodyPr>
+            <a:normAutofit/>
+          </a:bodyPr>
+          <a:lstStyle/>
+          <a:p>
+            <a:pPr algn="ctr"/>
+            <a:r>
+              <a:rPr lang="en-US" sz="2600">
+                <a:solidFill>
+                  <a:srgbClr val="FFFFFF"/>
+                </a:solidFill>
+              </a:rPr>
+              <a:t>Most Common Hashtags</a:t>
+            </a:r>
+          </a:p>
+        </p:txBody>
+      </p:sp>
+      <p:pic>
+        <p:nvPicPr>
+          <p:cNvPr id="6" name="Picture 5">
+            <a:extLst>
+              <a:ext uri="{FF2B5EF4-FFF2-40B4-BE49-F238E27FC236}">
+                <a16:creationId xmlns:a16="http://schemas.microsoft.com/office/drawing/2014/main" id="{81DA2904-F711-4FB5-B649-556EBBE31B76}"/>
+              </a:ext>
+            </a:extLst>
+          </p:cNvPr>
+          <p:cNvPicPr>
+            <a:picLocks noChangeAspect="1"/>
+          </p:cNvPicPr>
+          <p:nvPr/>
+        </p:nvPicPr>
+        <p:blipFill>
+          <a:blip r:embed="rId2"/>
+          <a:stretch>
+            <a:fillRect/>
+          </a:stretch>
+        </p:blipFill>
+        <p:spPr>
+          <a:xfrm>
+            <a:off x="3682999" y="839514"/>
+            <a:ext cx="7899400" cy="5272851"/>
+          </a:xfrm>
+          <a:prstGeom prst="rect">
+            <a:avLst/>
+          </a:prstGeom>
+        </p:spPr>
+      </p:pic>
+      <p:sp>
+        <p:nvSpPr>
+          <p:cNvPr id="4" name="Content Placeholder 3">
+            <a:extLst>
+              <a:ext uri="{FF2B5EF4-FFF2-40B4-BE49-F238E27FC236}">
+                <a16:creationId xmlns:a16="http://schemas.microsoft.com/office/drawing/2014/main" id="{6196D1A6-CF61-4F02-A623-202D82450072}"/>
+              </a:ext>
+            </a:extLst>
+          </p:cNvPr>
+          <p:cNvSpPr>
+            <a:spLocks noGrp="1"/>
+          </p:cNvSpPr>
+          <p:nvPr>
+            <p:ph idx="1"/>
+          </p:nvPr>
+        </p:nvSpPr>
+        <p:spPr>
+          <a:xfrm>
+            <a:off x="4038600" y="4632543"/>
+            <a:ext cx="7188199" cy="1479822"/>
+          </a:xfrm>
+        </p:spPr>
+        <p:txBody>
+          <a:bodyPr>
+            <a:normAutofit/>
+          </a:bodyPr>
+          <a:lstStyle/>
+          <a:p>
+            <a:endParaRPr lang="en-US" sz="1800"/>
+          </a:p>
+        </p:txBody>
+      </p:sp>
+    </p:spTree>
+    <p:extLst>
+      <p:ext uri="{BB962C8B-B14F-4D97-AF65-F5344CB8AC3E}">
+        <p14:creationId xmlns:p14="http://schemas.microsoft.com/office/powerpoint/2010/main" val="1425757719"/>
+      </p:ext>
+    </p:extLst>
+  </p:cSld>
+  <p:clrMapOvr>
+    <a:masterClrMapping/>
+  </p:clrMapOvr>
+</p:sld>
+</file>
+
+<file path=ppt/slides/slide8.xml><?xml version="1.0" encoding="utf-8"?>
+<p:sld xmlns:a="http://schemas.openxmlformats.org/drawingml/2006/main" xmlns:r="http://schemas.openxmlformats.org/officeDocument/2006/relationships" xmlns:p="http://schemas.openxmlformats.org/presentationml/2006/main">
+  <p:cSld>
+    <p:bg>
+      <p:bgPr>
+        <a:solidFill>
+          <a:schemeClr val="bg1">
+            <a:tint val="95000"/>
+            <a:satMod val="170000"/>
+          </a:schemeClr>
+        </a:solidFill>
+        <a:effectLst/>
+      </p:bgPr>
+    </p:bg>
+    <p:spTree>
+      <p:nvGrpSpPr>
+        <p:cNvPr id="1" name=""/>
+        <p:cNvGrpSpPr/>
+        <p:nvPr/>
+      </p:nvGrpSpPr>
+      <p:grpSpPr>
+        <a:xfrm>
+          <a:off x="0" y="0"/>
+          <a:ext cx="0" cy="0"/>
+          <a:chOff x="0" y="0"/>
+          <a:chExt cx="0" cy="0"/>
+        </a:xfrm>
+      </p:grpSpPr>
+      <p:sp>
+        <p:nvSpPr>
+          <p:cNvPr id="2" name="Title 1">
+            <a:extLst>
+              <a:ext uri="{FF2B5EF4-FFF2-40B4-BE49-F238E27FC236}">
                 <a16:creationId xmlns:a16="http://schemas.microsoft.com/office/drawing/2014/main" id="{B34B5440-BC61-4F30-AA54-D9B97B3A3528}"/>
               </a:ext>
             </a:extLst>
@@ -5214,7 +5629,7 @@
 </p:sld>
 </file>
 
-<file path=ppt/slides/slide8.xml><?xml version="1.0" encoding="utf-8"?>
+<file path=ppt/slides/slide9.xml><?xml version="1.0" encoding="utf-8"?>
 <p:sld xmlns:a="http://schemas.openxmlformats.org/drawingml/2006/main" xmlns:r="http://schemas.openxmlformats.org/officeDocument/2006/relationships" xmlns:p="http://schemas.openxmlformats.org/presentationml/2006/main">
   <p:cSld>
     <p:spTree>
@@ -5422,109 +5837,6 @@
     <p:extLst>
       <p:ext uri="{BB962C8B-B14F-4D97-AF65-F5344CB8AC3E}">
         <p14:creationId xmlns:p14="http://schemas.microsoft.com/office/powerpoint/2010/main" val="1168393276"/>
-      </p:ext>
-    </p:extLst>
-  </p:cSld>
-  <p:clrMapOvr>
-    <a:masterClrMapping/>
-  </p:clrMapOvr>
-</p:sld>
-</file>
-
-<file path=ppt/slides/slide9.xml><?xml version="1.0" encoding="utf-8"?>
-<p:sld xmlns:a="http://schemas.openxmlformats.org/drawingml/2006/main" xmlns:r="http://schemas.openxmlformats.org/officeDocument/2006/relationships" xmlns:p="http://schemas.openxmlformats.org/presentationml/2006/main">
-  <p:cSld>
-    <p:spTree>
-      <p:nvGrpSpPr>
-        <p:cNvPr id="1" name=""/>
-        <p:cNvGrpSpPr/>
-        <p:nvPr/>
-      </p:nvGrpSpPr>
-      <p:grpSpPr>
-        <a:xfrm>
-          <a:off x="0" y="0"/>
-          <a:ext cx="0" cy="0"/>
-          <a:chOff x="0" y="0"/>
-          <a:chExt cx="0" cy="0"/>
-        </a:xfrm>
-      </p:grpSpPr>
-      <p:sp>
-        <p:nvSpPr>
-          <p:cNvPr id="2" name="Title 1">
-            <a:extLst>
-              <a:ext uri="{FF2B5EF4-FFF2-40B4-BE49-F238E27FC236}">
-                <a16:creationId xmlns:a16="http://schemas.microsoft.com/office/drawing/2014/main" id="{D8ABFE92-CA9C-4311-8F64-0CF5962F3B9A}"/>
-              </a:ext>
-            </a:extLst>
-          </p:cNvPr>
-          <p:cNvSpPr>
-            <a:spLocks noGrp="1"/>
-          </p:cNvSpPr>
-          <p:nvPr>
-            <p:ph type="title"/>
-          </p:nvPr>
-        </p:nvSpPr>
-        <p:spPr/>
-        <p:txBody>
-          <a:bodyPr/>
-          <a:lstStyle/>
-          <a:p>
-            <a:r>
-              <a:rPr lang="en-US" dirty="0"/>
-              <a:t>Future Directions</a:t>
-            </a:r>
-          </a:p>
-        </p:txBody>
-      </p:sp>
-      <p:sp>
-        <p:nvSpPr>
-          <p:cNvPr id="3" name="Content Placeholder 2">
-            <a:extLst>
-              <a:ext uri="{FF2B5EF4-FFF2-40B4-BE49-F238E27FC236}">
-                <a16:creationId xmlns:a16="http://schemas.microsoft.com/office/drawing/2014/main" id="{88360C4A-A8BF-4F0D-A0D0-D7C0086BC976}"/>
-              </a:ext>
-            </a:extLst>
-          </p:cNvPr>
-          <p:cNvSpPr>
-            <a:spLocks noGrp="1"/>
-          </p:cNvSpPr>
-          <p:nvPr>
-            <p:ph idx="1"/>
-          </p:nvPr>
-        </p:nvSpPr>
-        <p:spPr/>
-        <p:txBody>
-          <a:bodyPr/>
-          <a:lstStyle/>
-          <a:p>
-            <a:r>
-              <a:rPr lang="en-US" dirty="0"/>
-              <a:t>By granting our organization Enterprise-level Twitter API access, we can provide even better predictive capabilities equipped with batch historical tweets.</a:t>
-            </a:r>
-          </a:p>
-          <a:p>
-            <a:r>
-              <a:rPr lang="en-US" dirty="0"/>
-              <a:t>We can build models upon our Natural Language Processing models to use our initial predictions combined with additional descriptive statistics. </a:t>
-            </a:r>
-          </a:p>
-          <a:p>
-            <a:r>
-              <a:rPr lang="en-US" dirty="0"/>
-              <a:t>We can produce more sophisticated neural networks to provide better </a:t>
-            </a:r>
-            <a:r>
-              <a:rPr lang="en-US"/>
-              <a:t>long-term analyses.</a:t>
-            </a:r>
-            <a:endParaRPr lang="en-US" dirty="0"/>
-          </a:p>
-        </p:txBody>
-      </p:sp>
-    </p:spTree>
-    <p:extLst>
-      <p:ext uri="{BB962C8B-B14F-4D97-AF65-F5344CB8AC3E}">
-        <p14:creationId xmlns:p14="http://schemas.microsoft.com/office/powerpoint/2010/main" val="3751182498"/>
       </p:ext>
     </p:extLst>
   </p:cSld>

</xml_diff>